<commit_message>
Filling up the ppt
</commit_message>
<xml_diff>
--- a/HolyJobs.pptx
+++ b/HolyJobs.pptx
@@ -9,12 +9,13 @@
     <p:sldId id="264" r:id="rId3"/>
     <p:sldId id="260" r:id="rId4"/>
     <p:sldId id="261" r:id="rId5"/>
-    <p:sldId id="257" r:id="rId6"/>
-    <p:sldId id="258" r:id="rId7"/>
-    <p:sldId id="259" r:id="rId8"/>
-    <p:sldId id="262" r:id="rId9"/>
-    <p:sldId id="265" r:id="rId10"/>
-    <p:sldId id="263" r:id="rId11"/>
+    <p:sldId id="266" r:id="rId6"/>
+    <p:sldId id="257" r:id="rId7"/>
+    <p:sldId id="258" r:id="rId8"/>
+    <p:sldId id="259" r:id="rId9"/>
+    <p:sldId id="262" r:id="rId10"/>
+    <p:sldId id="265" r:id="rId11"/>
+    <p:sldId id="263" r:id="rId12"/>
   </p:sldIdLst>
   <p:sldSz cx="12192000" cy="6858000"/>
   <p:notesSz cx="6858000" cy="9144000"/>
@@ -113,6 +114,11 @@
       </a:defRPr>
     </a:lvl9pPr>
   </p:defaultTextStyle>
+  <p:extLst>
+    <p:ext uri="{EFAFB233-063F-42B5-8137-9DF3F51BA10A}">
+      <p15:sldGuideLst xmlns:p15="http://schemas.microsoft.com/office/powerpoint/2012/main"/>
+    </p:ext>
+  </p:extLst>
 </p:presentation>
 </file>
 
@@ -247,7 +253,7 @@
           <a:p>
             <a:fld id="{1B3F413A-5FA9-422B-89F7-5A23C0255C07}" type="datetimeFigureOut">
               <a:rPr lang="fr-CH" smtClean="0"/>
-              <a:t>20.06.2016</a:t>
+              <a:t>21.06.2016</a:t>
             </a:fld>
             <a:endParaRPr lang="fr-CH"/>
           </a:p>
@@ -417,7 +423,7 @@
           <a:p>
             <a:fld id="{1B3F413A-5FA9-422B-89F7-5A23C0255C07}" type="datetimeFigureOut">
               <a:rPr lang="fr-CH" smtClean="0"/>
-              <a:t>20.06.2016</a:t>
+              <a:t>21.06.2016</a:t>
             </a:fld>
             <a:endParaRPr lang="fr-CH"/>
           </a:p>
@@ -597,7 +603,7 @@
           <a:p>
             <a:fld id="{1B3F413A-5FA9-422B-89F7-5A23C0255C07}" type="datetimeFigureOut">
               <a:rPr lang="fr-CH" smtClean="0"/>
-              <a:t>20.06.2016</a:t>
+              <a:t>21.06.2016</a:t>
             </a:fld>
             <a:endParaRPr lang="fr-CH"/>
           </a:p>
@@ -767,7 +773,7 @@
           <a:p>
             <a:fld id="{1B3F413A-5FA9-422B-89F7-5A23C0255C07}" type="datetimeFigureOut">
               <a:rPr lang="fr-CH" smtClean="0"/>
-              <a:t>20.06.2016</a:t>
+              <a:t>21.06.2016</a:t>
             </a:fld>
             <a:endParaRPr lang="fr-CH"/>
           </a:p>
@@ -1013,7 +1019,7 @@
           <a:p>
             <a:fld id="{1B3F413A-5FA9-422B-89F7-5A23C0255C07}" type="datetimeFigureOut">
               <a:rPr lang="fr-CH" smtClean="0"/>
-              <a:t>20.06.2016</a:t>
+              <a:t>21.06.2016</a:t>
             </a:fld>
             <a:endParaRPr lang="fr-CH"/>
           </a:p>
@@ -1245,7 +1251,7 @@
           <a:p>
             <a:fld id="{1B3F413A-5FA9-422B-89F7-5A23C0255C07}" type="datetimeFigureOut">
               <a:rPr lang="fr-CH" smtClean="0"/>
-              <a:t>20.06.2016</a:t>
+              <a:t>21.06.2016</a:t>
             </a:fld>
             <a:endParaRPr lang="fr-CH"/>
           </a:p>
@@ -1612,7 +1618,7 @@
           <a:p>
             <a:fld id="{1B3F413A-5FA9-422B-89F7-5A23C0255C07}" type="datetimeFigureOut">
               <a:rPr lang="fr-CH" smtClean="0"/>
-              <a:t>20.06.2016</a:t>
+              <a:t>21.06.2016</a:t>
             </a:fld>
             <a:endParaRPr lang="fr-CH"/>
           </a:p>
@@ -1730,7 +1736,7 @@
           <a:p>
             <a:fld id="{1B3F413A-5FA9-422B-89F7-5A23C0255C07}" type="datetimeFigureOut">
               <a:rPr lang="fr-CH" smtClean="0"/>
-              <a:t>20.06.2016</a:t>
+              <a:t>21.06.2016</a:t>
             </a:fld>
             <a:endParaRPr lang="fr-CH"/>
           </a:p>
@@ -1825,7 +1831,7 @@
           <a:p>
             <a:fld id="{1B3F413A-5FA9-422B-89F7-5A23C0255C07}" type="datetimeFigureOut">
               <a:rPr lang="fr-CH" smtClean="0"/>
-              <a:t>20.06.2016</a:t>
+              <a:t>21.06.2016</a:t>
             </a:fld>
             <a:endParaRPr lang="fr-CH"/>
           </a:p>
@@ -2102,7 +2108,7 @@
           <a:p>
             <a:fld id="{1B3F413A-5FA9-422B-89F7-5A23C0255C07}" type="datetimeFigureOut">
               <a:rPr lang="fr-CH" smtClean="0"/>
-              <a:t>20.06.2016</a:t>
+              <a:t>21.06.2016</a:t>
             </a:fld>
             <a:endParaRPr lang="fr-CH"/>
           </a:p>
@@ -2355,7 +2361,7 @@
           <a:p>
             <a:fld id="{1B3F413A-5FA9-422B-89F7-5A23C0255C07}" type="datetimeFigureOut">
               <a:rPr lang="fr-CH" smtClean="0"/>
-              <a:t>20.06.2016</a:t>
+              <a:t>21.06.2016</a:t>
             </a:fld>
             <a:endParaRPr lang="fr-CH"/>
           </a:p>
@@ -2568,7 +2574,7 @@
           <a:p>
             <a:fld id="{1B3F413A-5FA9-422B-89F7-5A23C0255C07}" type="datetimeFigureOut">
               <a:rPr lang="fr-CH" smtClean="0"/>
-              <a:t>20.06.2016</a:t>
+              <a:t>21.06.2016</a:t>
             </a:fld>
             <a:endParaRPr lang="fr-CH"/>
           </a:p>
@@ -3068,6 +3074,161 @@
           <a:lstStyle/>
           <a:p>
             <a:r>
+              <a:rPr lang="fr-CH" dirty="0" err="1" smtClean="0"/>
+              <a:t>What</a:t>
+            </a:r>
+            <a:r>
+              <a:rPr lang="fr-CH" dirty="0" smtClean="0"/>
+              <a:t> </a:t>
+            </a:r>
+            <a:r>
+              <a:rPr lang="fr-CH" dirty="0" err="1" smtClean="0"/>
+              <a:t>can</a:t>
+            </a:r>
+            <a:r>
+              <a:rPr lang="fr-CH" dirty="0" smtClean="0"/>
+              <a:t> </a:t>
+            </a:r>
+            <a:r>
+              <a:rPr lang="fr-CH" dirty="0" err="1" smtClean="0"/>
+              <a:t>we</a:t>
+            </a:r>
+            <a:r>
+              <a:rPr lang="fr-CH" dirty="0" smtClean="0"/>
+              <a:t> </a:t>
+            </a:r>
+            <a:r>
+              <a:rPr lang="fr-CH" dirty="0" err="1" smtClean="0"/>
+              <a:t>improve</a:t>
+            </a:r>
+            <a:r>
+              <a:rPr lang="fr-CH" dirty="0"/>
+              <a:t>?</a:t>
+            </a:r>
+          </a:p>
+        </p:txBody>
+      </p:sp>
+      <p:sp>
+        <p:nvSpPr>
+          <p:cNvPr id="3" name="Espace réservé du contenu 2"/>
+          <p:cNvSpPr>
+            <a:spLocks noGrp="1"/>
+          </p:cNvSpPr>
+          <p:nvPr>
+            <p:ph idx="1"/>
+          </p:nvPr>
+        </p:nvSpPr>
+        <p:spPr/>
+        <p:txBody>
+          <a:bodyPr/>
+          <a:lstStyle/>
+          <a:p>
+            <a:r>
+              <a:rPr lang="fr-CH" dirty="0" err="1" smtClean="0"/>
+              <a:t>Database</a:t>
+            </a:r>
+            <a:r>
+              <a:rPr lang="fr-CH" dirty="0" smtClean="0"/>
+              <a:t> </a:t>
+            </a:r>
+            <a:r>
+              <a:rPr lang="fr-CH" dirty="0" err="1" smtClean="0"/>
+              <a:t>queries</a:t>
+            </a:r>
+            <a:r>
+              <a:rPr lang="fr-CH" dirty="0" smtClean="0"/>
+              <a:t> </a:t>
+            </a:r>
+          </a:p>
+          <a:p>
+            <a:r>
+              <a:rPr lang="fr-CH" dirty="0" smtClean="0"/>
+              <a:t>DB </a:t>
+            </a:r>
+            <a:r>
+              <a:rPr lang="fr-CH" dirty="0" err="1" smtClean="0"/>
+              <a:t>queries</a:t>
+            </a:r>
+            <a:r>
+              <a:rPr lang="fr-CH" dirty="0" smtClean="0"/>
+              <a:t> class (in case </a:t>
+            </a:r>
+            <a:r>
+              <a:rPr lang="fr-CH" dirty="0" err="1" smtClean="0"/>
+              <a:t>we</a:t>
+            </a:r>
+            <a:r>
+              <a:rPr lang="fr-CH" dirty="0" smtClean="0"/>
+              <a:t> drop </a:t>
+            </a:r>
+            <a:r>
+              <a:rPr lang="fr-CH" dirty="0" err="1" smtClean="0"/>
+              <a:t>Slick</a:t>
+            </a:r>
+            <a:r>
+              <a:rPr lang="fr-CH" dirty="0" smtClean="0"/>
+              <a:t>)</a:t>
+            </a:r>
+            <a:endParaRPr lang="fr-CH" dirty="0"/>
+          </a:p>
+          <a:p>
+            <a:endParaRPr lang="fr-CH" dirty="0"/>
+          </a:p>
+        </p:txBody>
+      </p:sp>
+    </p:spTree>
+    <p:extLst>
+      <p:ext uri="{BB962C8B-B14F-4D97-AF65-F5344CB8AC3E}">
+        <p14:creationId xmlns:p14="http://schemas.microsoft.com/office/powerpoint/2010/main" val="364832468"/>
+      </p:ext>
+    </p:extLst>
+  </p:cSld>
+  <p:clrMapOvr>
+    <a:masterClrMapping/>
+  </p:clrMapOvr>
+  <p:timing>
+    <p:tnLst>
+      <p:par>
+        <p:cTn id="1" dur="indefinite" restart="never" nodeType="tmRoot"/>
+      </p:par>
+    </p:tnLst>
+  </p:timing>
+</p:sld>
+</file>
+
+<file path=ppt/slides/slide11.xml><?xml version="1.0" encoding="utf-8"?>
+<p:sld xmlns:a="http://schemas.openxmlformats.org/drawingml/2006/main" xmlns:r="http://schemas.openxmlformats.org/officeDocument/2006/relationships" xmlns:p="http://schemas.openxmlformats.org/presentationml/2006/main">
+  <p:cSld>
+    <p:spTree>
+      <p:nvGrpSpPr>
+        <p:cNvPr id="1" name=""/>
+        <p:cNvGrpSpPr/>
+        <p:nvPr/>
+      </p:nvGrpSpPr>
+      <p:grpSpPr>
+        <a:xfrm>
+          <a:off x="0" y="0"/>
+          <a:ext cx="0" cy="0"/>
+          <a:chOff x="0" y="0"/>
+          <a:chExt cx="0" cy="0"/>
+        </a:xfrm>
+      </p:grpSpPr>
+      <p:sp>
+        <p:nvSpPr>
+          <p:cNvPr id="2" name="Titre 1"/>
+          <p:cNvSpPr>
+            <a:spLocks noGrp="1"/>
+          </p:cNvSpPr>
+          <p:nvPr>
+            <p:ph type="title"/>
+          </p:nvPr>
+        </p:nvSpPr>
+        <p:spPr/>
+        <p:txBody>
+          <a:bodyPr/>
+          <a:lstStyle/>
+          <a:p>
+            <a:r>
               <a:rPr lang="fr-CH" dirty="0" smtClean="0"/>
               <a:t>Conclusion</a:t>
             </a:r>
@@ -3407,7 +3568,69 @@
           <a:bodyPr/>
           <a:lstStyle/>
           <a:p>
-            <a:endParaRPr lang="fr-CH"/>
+            <a:r>
+              <a:rPr lang="fr-CH" dirty="0" err="1" smtClean="0"/>
+              <a:t>Looking</a:t>
+            </a:r>
+            <a:r>
+              <a:rPr lang="fr-CH" dirty="0" smtClean="0"/>
+              <a:t> for a job </a:t>
+            </a:r>
+            <a:r>
+              <a:rPr lang="fr-CH" dirty="0" err="1" smtClean="0"/>
+              <a:t>during</a:t>
+            </a:r>
+            <a:r>
+              <a:rPr lang="fr-CH" dirty="0" smtClean="0"/>
+              <a:t> </a:t>
+            </a:r>
+            <a:r>
+              <a:rPr lang="fr-CH" dirty="0" err="1" smtClean="0"/>
+              <a:t>your</a:t>
+            </a:r>
+            <a:r>
+              <a:rPr lang="fr-CH" dirty="0" smtClean="0"/>
+              <a:t> </a:t>
+            </a:r>
+            <a:r>
+              <a:rPr lang="fr-CH" dirty="0" err="1" smtClean="0"/>
+              <a:t>holidays</a:t>
+            </a:r>
+            <a:r>
+              <a:rPr lang="fr-CH" dirty="0" smtClean="0"/>
+              <a:t>?</a:t>
+            </a:r>
+          </a:p>
+          <a:p>
+            <a:r>
+              <a:rPr lang="fr-CH" dirty="0" err="1" smtClean="0"/>
+              <a:t>Offering</a:t>
+            </a:r>
+            <a:r>
+              <a:rPr lang="fr-CH" dirty="0" smtClean="0"/>
+              <a:t> a job for </a:t>
+            </a:r>
+            <a:r>
+              <a:rPr lang="fr-CH" dirty="0" err="1" smtClean="0"/>
+              <a:t>some</a:t>
+            </a:r>
+            <a:r>
+              <a:rPr lang="fr-CH" dirty="0" smtClean="0"/>
+              <a:t> </a:t>
+            </a:r>
+            <a:r>
+              <a:rPr lang="fr-CH" dirty="0" err="1" smtClean="0"/>
+              <a:t>pitiful</a:t>
+            </a:r>
+            <a:r>
+              <a:rPr lang="fr-CH" dirty="0" smtClean="0"/>
+              <a:t> </a:t>
+            </a:r>
+            <a:r>
+              <a:rPr lang="fr-CH" dirty="0" err="1" smtClean="0"/>
+              <a:t>student</a:t>
+            </a:r>
+            <a:endParaRPr lang="fr-CH" dirty="0"/>
           </a:p>
         </p:txBody>
       </p:sp>
@@ -3572,11 +3795,7 @@
           <a:p>
             <a:r>
               <a:rPr lang="fr-CH" dirty="0" smtClean="0"/>
-              <a:t>Scala </a:t>
-            </a:r>
-            <a:r>
-              <a:rPr lang="fr-CH" dirty="0" err="1" smtClean="0"/>
-              <a:t>Js</a:t>
+              <a:t>Play	</a:t>
             </a:r>
             <a:endParaRPr lang="fr-CH" dirty="0"/>
           </a:p>
@@ -3597,14 +3816,14 @@
           <a:bodyPr/>
           <a:lstStyle/>
           <a:p>
-            <a:endParaRPr lang="fr-CH"/>
+            <a:endParaRPr lang="fr-CH" dirty="0"/>
           </a:p>
         </p:txBody>
       </p:sp>
     </p:spTree>
     <p:extLst>
       <p:ext uri="{BB962C8B-B14F-4D97-AF65-F5344CB8AC3E}">
-        <p14:creationId xmlns:p14="http://schemas.microsoft.com/office/powerpoint/2010/main" val="3571496690"/>
+        <p14:creationId xmlns:p14="http://schemas.microsoft.com/office/powerpoint/2010/main" val="1067979562"/>
       </p:ext>
     </p:extLst>
   </p:cSld>
@@ -3654,8 +3873,12 @@
           <a:lstStyle/>
           <a:p>
             <a:r>
-              <a:rPr lang="fr-CH" dirty="0" err="1" smtClean="0"/>
-              <a:t>Slick</a:t>
+              <a:rPr lang="fr-CH" dirty="0" smtClean="0"/>
+              <a:t>Scala </a:t>
+            </a:r>
+            <a:r>
+              <a:rPr lang="fr-CH" dirty="0" err="1" smtClean="0"/>
+              <a:t>Js</a:t>
             </a:r>
             <a:endParaRPr lang="fr-CH" dirty="0"/>
           </a:p>
@@ -3683,7 +3906,7 @@
     </p:spTree>
     <p:extLst>
       <p:ext uri="{BB962C8B-B14F-4D97-AF65-F5344CB8AC3E}">
-        <p14:creationId xmlns:p14="http://schemas.microsoft.com/office/powerpoint/2010/main" val="3502699494"/>
+        <p14:creationId xmlns:p14="http://schemas.microsoft.com/office/powerpoint/2010/main" val="3571496690"/>
       </p:ext>
     </p:extLst>
   </p:cSld>
@@ -3734,7 +3957,7 @@
           <a:p>
             <a:r>
               <a:rPr lang="fr-CH" dirty="0" err="1" smtClean="0"/>
-              <a:t>Demo</a:t>
+              <a:t>Slick</a:t>
             </a:r>
             <a:endParaRPr lang="fr-CH" dirty="0"/>
           </a:p>
@@ -3755,14 +3978,83 @@
           <a:bodyPr/>
           <a:lstStyle/>
           <a:p>
-            <a:endParaRPr lang="fr-CH"/>
+            <a:r>
+              <a:rPr lang="fr-CH" dirty="0" smtClean="0"/>
+              <a:t>Not </a:t>
+            </a:r>
+            <a:r>
+              <a:rPr lang="fr-CH" dirty="0" err="1" smtClean="0"/>
+              <a:t>so</a:t>
+            </a:r>
+            <a:r>
+              <a:rPr lang="fr-CH" dirty="0" smtClean="0"/>
+              <a:t> simple setup</a:t>
+            </a:r>
+          </a:p>
+          <a:p>
+            <a:pPr lvl="1"/>
+            <a:r>
+              <a:rPr lang="fr-CH" dirty="0" err="1" smtClean="0"/>
+              <a:t>Careful</a:t>
+            </a:r>
+            <a:r>
+              <a:rPr lang="fr-CH" dirty="0" smtClean="0"/>
+              <a:t> </a:t>
+            </a:r>
+            <a:r>
+              <a:rPr lang="fr-CH" dirty="0" err="1" smtClean="0"/>
+              <a:t>with</a:t>
+            </a:r>
+            <a:r>
+              <a:rPr lang="fr-CH" dirty="0" smtClean="0"/>
+              <a:t> </a:t>
+            </a:r>
+            <a:r>
+              <a:rPr lang="fr-CH" dirty="0" err="1" smtClean="0"/>
+              <a:t>small</a:t>
+            </a:r>
+            <a:r>
+              <a:rPr lang="fr-CH" dirty="0" smtClean="0"/>
+              <a:t> </a:t>
+            </a:r>
+            <a:r>
+              <a:rPr lang="fr-CH" dirty="0" err="1" smtClean="0"/>
+              <a:t>details</a:t>
+            </a:r>
+            <a:endParaRPr lang="fr-CH" dirty="0" smtClean="0"/>
+          </a:p>
+          <a:p>
+            <a:r>
+              <a:rPr lang="fr-CH" dirty="0" err="1" smtClean="0"/>
+              <a:t>Easy</a:t>
+            </a:r>
+            <a:r>
+              <a:rPr lang="fr-CH" dirty="0" smtClean="0"/>
+              <a:t> to </a:t>
+            </a:r>
+            <a:r>
+              <a:rPr lang="fr-CH" dirty="0" err="1" smtClean="0"/>
+              <a:t>create</a:t>
+            </a:r>
+            <a:r>
+              <a:rPr lang="fr-CH" dirty="0" smtClean="0"/>
+              <a:t> </a:t>
+            </a:r>
+            <a:r>
+              <a:rPr lang="fr-CH" dirty="0" err="1" smtClean="0"/>
+              <a:t>queries</a:t>
+            </a:r>
+            <a:endParaRPr lang="fr-CH" dirty="0" smtClean="0"/>
+          </a:p>
+          <a:p>
+            <a:endParaRPr lang="fr-CH" dirty="0"/>
           </a:p>
         </p:txBody>
       </p:sp>
     </p:spTree>
     <p:extLst>
       <p:ext uri="{BB962C8B-B14F-4D97-AF65-F5344CB8AC3E}">
-        <p14:creationId xmlns:p14="http://schemas.microsoft.com/office/powerpoint/2010/main" val="2139019132"/>
+        <p14:creationId xmlns:p14="http://schemas.microsoft.com/office/powerpoint/2010/main" val="3502699494"/>
       </p:ext>
     </p:extLst>
   </p:cSld>
@@ -3813,11 +4105,7 @@
           <a:p>
             <a:r>
               <a:rPr lang="fr-CH" dirty="0" err="1" smtClean="0"/>
-              <a:t>Problems</a:t>
-            </a:r>
-            <a:r>
-              <a:rPr lang="fr-CH" dirty="0" smtClean="0"/>
-              <a:t>?</a:t>
+              <a:t>Demo</a:t>
             </a:r>
             <a:endParaRPr lang="fr-CH" dirty="0"/>
           </a:p>
@@ -3845,7 +4133,7 @@
     </p:spTree>
     <p:extLst>
       <p:ext uri="{BB962C8B-B14F-4D97-AF65-F5344CB8AC3E}">
-        <p14:creationId xmlns:p14="http://schemas.microsoft.com/office/powerpoint/2010/main" val="21249489"/>
+        <p14:creationId xmlns:p14="http://schemas.microsoft.com/office/powerpoint/2010/main" val="2139019132"/>
       </p:ext>
     </p:extLst>
   </p:cSld>
@@ -3896,36 +4184,13 @@
           <a:p>
             <a:r>
               <a:rPr lang="fr-CH" dirty="0" err="1" smtClean="0"/>
-              <a:t>What</a:t>
-            </a:r>
-            <a:r>
-              <a:rPr lang="fr-CH" dirty="0" smtClean="0"/>
-              <a:t> </a:t>
-            </a:r>
-            <a:r>
-              <a:rPr lang="fr-CH" dirty="0" err="1" smtClean="0"/>
-              <a:t>can</a:t>
-            </a:r>
-            <a:r>
-              <a:rPr lang="fr-CH" dirty="0" smtClean="0"/>
-              <a:t> </a:t>
-            </a:r>
-            <a:r>
-              <a:rPr lang="fr-CH" dirty="0" err="1" smtClean="0"/>
-              <a:t>we</a:t>
-            </a:r>
-            <a:r>
-              <a:rPr lang="fr-CH" dirty="0" smtClean="0"/>
-              <a:t> </a:t>
-            </a:r>
-            <a:r>
-              <a:rPr lang="fr-CH" dirty="0" err="1" smtClean="0"/>
-              <a:t>improve</a:t>
-            </a:r>
-            <a:r>
-              <a:rPr lang="fr-CH" dirty="0"/>
+              <a:t>Problems</a:t>
+            </a:r>
+            <a:r>
+              <a:rPr lang="fr-CH" dirty="0" smtClean="0"/>
               <a:t>?</a:t>
             </a:r>
+            <a:endParaRPr lang="fr-CH" dirty="0"/>
           </a:p>
         </p:txBody>
       </p:sp>
@@ -3944,14 +4209,35 @@
           <a:bodyPr/>
           <a:lstStyle/>
           <a:p>
-            <a:endParaRPr lang="fr-CH"/>
+            <a:r>
+              <a:rPr lang="fr-CH" dirty="0" err="1" smtClean="0"/>
+              <a:t>Scala.Js</a:t>
+            </a:r>
+            <a:endParaRPr lang="fr-CH" dirty="0" smtClean="0"/>
+          </a:p>
+          <a:p>
+            <a:r>
+              <a:rPr lang="fr-CH" dirty="0" smtClean="0"/>
+              <a:t>Template </a:t>
+            </a:r>
+            <a:r>
+              <a:rPr lang="fr-CH" dirty="0" err="1" smtClean="0"/>
+              <a:t>project</a:t>
+            </a:r>
+            <a:endParaRPr lang="fr-CH" dirty="0" smtClean="0"/>
+          </a:p>
+          <a:p>
+            <a:pPr marL="0" indent="0">
+              <a:buNone/>
+            </a:pPr>
+            <a:endParaRPr lang="fr-CH" dirty="0"/>
           </a:p>
         </p:txBody>
       </p:sp>
     </p:spTree>
     <p:extLst>
       <p:ext uri="{BB962C8B-B14F-4D97-AF65-F5344CB8AC3E}">
-        <p14:creationId xmlns:p14="http://schemas.microsoft.com/office/powerpoint/2010/main" val="364832468"/>
+        <p14:creationId xmlns:p14="http://schemas.microsoft.com/office/powerpoint/2010/main" val="21249489"/>
       </p:ext>
     </p:extLst>
   </p:cSld>

</xml_diff>